<commit_message>
Update otn slicing discussion slides.pptx
Add slides for NBI modeling discussion
</commit_message>
<xml_diff>
--- a/Meeting Materials/otn slicing discussion slides.pptx
+++ b/Meeting Materials/otn slicing discussion slides.pptx
@@ -5,7 +5,7 @@
     <p:sldMasterId id="2147483648" r:id="rId1"/>
   </p:sldMasterIdLst>
   <p:notesMasterIdLst>
-    <p:notesMasterId r:id="rId25"/>
+    <p:notesMasterId r:id="rId27"/>
   </p:notesMasterIdLst>
   <p:sldIdLst>
     <p:sldId id="260" r:id="rId2"/>
@@ -31,6 +31,8 @@
     <p:sldId id="300" r:id="rId22"/>
     <p:sldId id="301" r:id="rId23"/>
     <p:sldId id="302" r:id="rId24"/>
+    <p:sldId id="304" r:id="rId25"/>
+    <p:sldId id="303" r:id="rId26"/>
   </p:sldIdLst>
   <p:sldSz cx="9144000" cy="5715000" type="screen16x10"/>
   <p:notesSz cx="6858000" cy="9144000"/>
@@ -230,7 +232,7 @@
           <a:p>
             <a:fld id="{C7088273-5D22-4A56-BE72-519293F1A8F6}" type="datetimeFigureOut">
               <a:rPr lang="en-US" smtClean="0"/>
-              <a:t>9/29/2021</a:t>
+              <a:t>10/6/2021</a:t>
             </a:fld>
             <a:endParaRPr lang="en-US"/>
           </a:p>
@@ -926,6 +928,174 @@
 </p:notes>
 </file>
 
+<file path=ppt/notesSlides/notesSlide14.xml><?xml version="1.0" encoding="utf-8"?>
+<p:notes xmlns:a="http://schemas.openxmlformats.org/drawingml/2006/main" xmlns:r="http://schemas.openxmlformats.org/officeDocument/2006/relationships" xmlns:p="http://schemas.openxmlformats.org/presentationml/2006/main">
+  <p:cSld>
+    <p:spTree>
+      <p:nvGrpSpPr>
+        <p:cNvPr id="1" name=""/>
+        <p:cNvGrpSpPr/>
+        <p:nvPr/>
+      </p:nvGrpSpPr>
+      <p:grpSpPr>
+        <a:xfrm>
+          <a:off x="0" y="0"/>
+          <a:ext cx="0" cy="0"/>
+          <a:chOff x="0" y="0"/>
+          <a:chExt cx="0" cy="0"/>
+        </a:xfrm>
+      </p:grpSpPr>
+      <p:sp>
+        <p:nvSpPr>
+          <p:cNvPr id="2" name="Slide Image Placeholder 1"/>
+          <p:cNvSpPr>
+            <a:spLocks noGrp="1" noRot="1" noChangeAspect="1"/>
+          </p:cNvSpPr>
+          <p:nvPr>
+            <p:ph type="sldImg"/>
+          </p:nvPr>
+        </p:nvSpPr>
+        <p:spPr/>
+      </p:sp>
+      <p:sp>
+        <p:nvSpPr>
+          <p:cNvPr id="3" name="Notes Placeholder 2"/>
+          <p:cNvSpPr>
+            <a:spLocks noGrp="1"/>
+          </p:cNvSpPr>
+          <p:nvPr>
+            <p:ph type="body" idx="1"/>
+          </p:nvPr>
+        </p:nvSpPr>
+        <p:spPr/>
+        <p:txBody>
+          <a:bodyPr/>
+          <a:lstStyle/>
+          <a:p>
+            <a:endParaRPr lang="en-US" dirty="0"/>
+          </a:p>
+        </p:txBody>
+      </p:sp>
+      <p:sp>
+        <p:nvSpPr>
+          <p:cNvPr id="4" name="Slide Number Placeholder 3"/>
+          <p:cNvSpPr>
+            <a:spLocks noGrp="1"/>
+          </p:cNvSpPr>
+          <p:nvPr>
+            <p:ph type="sldNum" sz="quarter" idx="10"/>
+          </p:nvPr>
+        </p:nvSpPr>
+        <p:spPr/>
+        <p:txBody>
+          <a:bodyPr/>
+          <a:lstStyle/>
+          <a:p>
+            <a:fld id="{4066C2EC-F3B6-4CF7-8A67-99EC2A32E023}" type="slidenum">
+              <a:rPr lang="en-US" smtClean="0"/>
+              <a:t>24</a:t>
+            </a:fld>
+            <a:endParaRPr lang="en-US"/>
+          </a:p>
+        </p:txBody>
+      </p:sp>
+    </p:spTree>
+    <p:extLst>
+      <p:ext uri="{BB962C8B-B14F-4D97-AF65-F5344CB8AC3E}">
+        <p14:creationId xmlns:p14="http://schemas.microsoft.com/office/powerpoint/2010/main" val="20888586"/>
+      </p:ext>
+    </p:extLst>
+  </p:cSld>
+  <p:clrMapOvr>
+    <a:masterClrMapping/>
+  </p:clrMapOvr>
+</p:notes>
+</file>
+
+<file path=ppt/notesSlides/notesSlide15.xml><?xml version="1.0" encoding="utf-8"?>
+<p:notes xmlns:a="http://schemas.openxmlformats.org/drawingml/2006/main" xmlns:r="http://schemas.openxmlformats.org/officeDocument/2006/relationships" xmlns:p="http://schemas.openxmlformats.org/presentationml/2006/main">
+  <p:cSld>
+    <p:spTree>
+      <p:nvGrpSpPr>
+        <p:cNvPr id="1" name=""/>
+        <p:cNvGrpSpPr/>
+        <p:nvPr/>
+      </p:nvGrpSpPr>
+      <p:grpSpPr>
+        <a:xfrm>
+          <a:off x="0" y="0"/>
+          <a:ext cx="0" cy="0"/>
+          <a:chOff x="0" y="0"/>
+          <a:chExt cx="0" cy="0"/>
+        </a:xfrm>
+      </p:grpSpPr>
+      <p:sp>
+        <p:nvSpPr>
+          <p:cNvPr id="2" name="Slide Image Placeholder 1"/>
+          <p:cNvSpPr>
+            <a:spLocks noGrp="1" noRot="1" noChangeAspect="1"/>
+          </p:cNvSpPr>
+          <p:nvPr>
+            <p:ph type="sldImg"/>
+          </p:nvPr>
+        </p:nvSpPr>
+        <p:spPr/>
+      </p:sp>
+      <p:sp>
+        <p:nvSpPr>
+          <p:cNvPr id="3" name="Notes Placeholder 2"/>
+          <p:cNvSpPr>
+            <a:spLocks noGrp="1"/>
+          </p:cNvSpPr>
+          <p:nvPr>
+            <p:ph type="body" idx="1"/>
+          </p:nvPr>
+        </p:nvSpPr>
+        <p:spPr/>
+        <p:txBody>
+          <a:bodyPr/>
+          <a:lstStyle/>
+          <a:p>
+            <a:endParaRPr lang="en-US" dirty="0"/>
+          </a:p>
+        </p:txBody>
+      </p:sp>
+      <p:sp>
+        <p:nvSpPr>
+          <p:cNvPr id="4" name="Slide Number Placeholder 3"/>
+          <p:cNvSpPr>
+            <a:spLocks noGrp="1"/>
+          </p:cNvSpPr>
+          <p:nvPr>
+            <p:ph type="sldNum" sz="quarter" idx="10"/>
+          </p:nvPr>
+        </p:nvSpPr>
+        <p:spPr/>
+        <p:txBody>
+          <a:bodyPr/>
+          <a:lstStyle/>
+          <a:p>
+            <a:fld id="{4066C2EC-F3B6-4CF7-8A67-99EC2A32E023}" type="slidenum">
+              <a:rPr lang="en-US" smtClean="0"/>
+              <a:t>25</a:t>
+            </a:fld>
+            <a:endParaRPr lang="en-US"/>
+          </a:p>
+        </p:txBody>
+      </p:sp>
+    </p:spTree>
+    <p:extLst>
+      <p:ext uri="{BB962C8B-B14F-4D97-AF65-F5344CB8AC3E}">
+        <p14:creationId xmlns:p14="http://schemas.microsoft.com/office/powerpoint/2010/main" val="3222829443"/>
+      </p:ext>
+    </p:extLst>
+  </p:cSld>
+  <p:clrMapOvr>
+    <a:masterClrMapping/>
+  </p:clrMapOvr>
+</p:notes>
+</file>
+
 <file path=ppt/notesSlides/notesSlide2.xml><?xml version="1.0" encoding="utf-8"?>
 <p:notes xmlns:a="http://schemas.openxmlformats.org/drawingml/2006/main" xmlns:r="http://schemas.openxmlformats.org/officeDocument/2006/relationships" xmlns:p="http://schemas.openxmlformats.org/presentationml/2006/main">
   <p:cSld>
@@ -1777,7 +1947,7 @@
           <a:p>
             <a:fld id="{65842DE4-D429-4C03-877D-BC36F66EF94D}" type="datetimeFigureOut">
               <a:rPr lang="en-US" smtClean="0"/>
-              <a:t>9/29/2021</a:t>
+              <a:t>10/6/2021</a:t>
             </a:fld>
             <a:endParaRPr lang="en-US"/>
           </a:p>
@@ -1945,7 +2115,7 @@
           <a:p>
             <a:fld id="{65842DE4-D429-4C03-877D-BC36F66EF94D}" type="datetimeFigureOut">
               <a:rPr lang="en-US" smtClean="0"/>
-              <a:t>9/29/2021</a:t>
+              <a:t>10/6/2021</a:t>
             </a:fld>
             <a:endParaRPr lang="en-US"/>
           </a:p>
@@ -2123,7 +2293,7 @@
           <a:p>
             <a:fld id="{65842DE4-D429-4C03-877D-BC36F66EF94D}" type="datetimeFigureOut">
               <a:rPr lang="en-US" smtClean="0"/>
-              <a:t>9/29/2021</a:t>
+              <a:t>10/6/2021</a:t>
             </a:fld>
             <a:endParaRPr lang="en-US"/>
           </a:p>
@@ -2291,7 +2461,7 @@
           <a:p>
             <a:fld id="{65842DE4-D429-4C03-877D-BC36F66EF94D}" type="datetimeFigureOut">
               <a:rPr lang="en-US" smtClean="0"/>
-              <a:t>9/29/2021</a:t>
+              <a:t>10/6/2021</a:t>
             </a:fld>
             <a:endParaRPr lang="en-US"/>
           </a:p>
@@ -2536,7 +2706,7 @@
           <a:p>
             <a:fld id="{65842DE4-D429-4C03-877D-BC36F66EF94D}" type="datetimeFigureOut">
               <a:rPr lang="en-US" smtClean="0"/>
-              <a:t>9/29/2021</a:t>
+              <a:t>10/6/2021</a:t>
             </a:fld>
             <a:endParaRPr lang="en-US"/>
           </a:p>
@@ -2821,7 +2991,7 @@
           <a:p>
             <a:fld id="{65842DE4-D429-4C03-877D-BC36F66EF94D}" type="datetimeFigureOut">
               <a:rPr lang="en-US" smtClean="0"/>
-              <a:t>9/29/2021</a:t>
+              <a:t>10/6/2021</a:t>
             </a:fld>
             <a:endParaRPr lang="en-US"/>
           </a:p>
@@ -3240,7 +3410,7 @@
           <a:p>
             <a:fld id="{65842DE4-D429-4C03-877D-BC36F66EF94D}" type="datetimeFigureOut">
               <a:rPr lang="en-US" smtClean="0"/>
-              <a:t>9/29/2021</a:t>
+              <a:t>10/6/2021</a:t>
             </a:fld>
             <a:endParaRPr lang="en-US"/>
           </a:p>
@@ -3357,7 +3527,7 @@
           <a:p>
             <a:fld id="{65842DE4-D429-4C03-877D-BC36F66EF94D}" type="datetimeFigureOut">
               <a:rPr lang="en-US" smtClean="0"/>
-              <a:t>9/29/2021</a:t>
+              <a:t>10/6/2021</a:t>
             </a:fld>
             <a:endParaRPr lang="en-US"/>
           </a:p>
@@ -3452,7 +3622,7 @@
           <a:p>
             <a:fld id="{65842DE4-D429-4C03-877D-BC36F66EF94D}" type="datetimeFigureOut">
               <a:rPr lang="en-US" smtClean="0"/>
-              <a:t>9/29/2021</a:t>
+              <a:t>10/6/2021</a:t>
             </a:fld>
             <a:endParaRPr lang="en-US"/>
           </a:p>
@@ -3727,7 +3897,7 @@
           <a:p>
             <a:fld id="{65842DE4-D429-4C03-877D-BC36F66EF94D}" type="datetimeFigureOut">
               <a:rPr lang="en-US" smtClean="0"/>
-              <a:t>9/29/2021</a:t>
+              <a:t>10/6/2021</a:t>
             </a:fld>
             <a:endParaRPr lang="en-US"/>
           </a:p>
@@ -3979,7 +4149,7 @@
           <a:p>
             <a:fld id="{65842DE4-D429-4C03-877D-BC36F66EF94D}" type="datetimeFigureOut">
               <a:rPr lang="en-US" smtClean="0"/>
-              <a:t>9/29/2021</a:t>
+              <a:t>10/6/2021</a:t>
             </a:fld>
             <a:endParaRPr lang="en-US"/>
           </a:p>
@@ -4190,7 +4360,7 @@
           <a:p>
             <a:fld id="{65842DE4-D429-4C03-877D-BC36F66EF94D}" type="datetimeFigureOut">
               <a:rPr lang="en-US" smtClean="0"/>
-              <a:t>9/29/2021</a:t>
+              <a:t>10/6/2021</a:t>
             </a:fld>
             <a:endParaRPr lang="en-US"/>
           </a:p>
@@ -23278,6 +23448,1627 @@
     <p:extLst>
       <p:ext uri="{BB962C8B-B14F-4D97-AF65-F5344CB8AC3E}">
         <p14:creationId xmlns:p14="http://schemas.microsoft.com/office/powerpoint/2010/main" val="1767660672"/>
+      </p:ext>
+    </p:extLst>
+  </p:cSld>
+  <p:clrMapOvr>
+    <a:masterClrMapping/>
+  </p:clrMapOvr>
+</p:sld>
+</file>
+
+<file path=ppt/slides/slide24.xml><?xml version="1.0" encoding="utf-8"?>
+<p:sld xmlns:a="http://schemas.openxmlformats.org/drawingml/2006/main" xmlns:r="http://schemas.openxmlformats.org/officeDocument/2006/relationships" xmlns:p="http://schemas.openxmlformats.org/presentationml/2006/main">
+  <p:cSld>
+    <p:spTree>
+      <p:nvGrpSpPr>
+        <p:cNvPr id="1" name=""/>
+        <p:cNvGrpSpPr/>
+        <p:nvPr/>
+      </p:nvGrpSpPr>
+      <p:grpSpPr>
+        <a:xfrm>
+          <a:off x="0" y="0"/>
+          <a:ext cx="0" cy="0"/>
+          <a:chOff x="0" y="0"/>
+          <a:chExt cx="0" cy="0"/>
+        </a:xfrm>
+      </p:grpSpPr>
+      <p:sp>
+        <p:nvSpPr>
+          <p:cNvPr id="2" name="Title 1">
+            <a:extLst>
+              <a:ext uri="{FF2B5EF4-FFF2-40B4-BE49-F238E27FC236}">
+                <a16:creationId xmlns:a16="http://schemas.microsoft.com/office/drawing/2014/main" id="{EB3E31FD-1C2F-48A6-AB51-148D4276F8C0}"/>
+              </a:ext>
+            </a:extLst>
+          </p:cNvPr>
+          <p:cNvSpPr>
+            <a:spLocks noGrp="1"/>
+          </p:cNvSpPr>
+          <p:nvPr>
+            <p:ph type="title"/>
+          </p:nvPr>
+        </p:nvSpPr>
+        <p:spPr>
+          <a:xfrm>
+            <a:off x="457200" y="114300"/>
+            <a:ext cx="8229600" cy="533665"/>
+          </a:xfrm>
+        </p:spPr>
+        <p:txBody>
+          <a:bodyPr>
+            <a:noAutofit/>
+          </a:bodyPr>
+          <a:lstStyle/>
+          <a:p>
+            <a:r>
+              <a:rPr lang="en-US" sz="3200" dirty="0"/>
+              <a:t>Generic Model Proposal (</a:t>
+            </a:r>
+            <a:r>
+              <a:rPr lang="en-US" sz="3200" dirty="0" err="1"/>
+              <a:t>Xufeng’s</a:t>
+            </a:r>
+            <a:r>
+              <a:rPr lang="en-US" sz="3200" dirty="0"/>
+              <a:t> Proposal)</a:t>
+            </a:r>
+          </a:p>
+        </p:txBody>
+      </p:sp>
+      <p:sp>
+        <p:nvSpPr>
+          <p:cNvPr id="5" name="TextBox 4">
+            <a:extLst>
+              <a:ext uri="{FF2B5EF4-FFF2-40B4-BE49-F238E27FC236}">
+                <a16:creationId xmlns:a16="http://schemas.microsoft.com/office/drawing/2014/main" id="{803439C6-F6EA-49D4-93F8-47A194FA2D42}"/>
+              </a:ext>
+            </a:extLst>
+          </p:cNvPr>
+          <p:cNvSpPr txBox="1"/>
+          <p:nvPr/>
+        </p:nvSpPr>
+        <p:spPr>
+          <a:xfrm>
+            <a:off x="1295400" y="1257300"/>
+            <a:ext cx="7315200" cy="1477328"/>
+          </a:xfrm>
+          <a:prstGeom prst="rect">
+            <a:avLst/>
+          </a:prstGeom>
+          <a:noFill/>
+        </p:spPr>
+        <p:txBody>
+          <a:bodyPr wrap="square">
+            <a:spAutoFit/>
+          </a:bodyPr>
+          <a:lstStyle/>
+          <a:p>
+            <a:r>
+              <a:rPr lang="en-US" sz="900" dirty="0">
+                <a:latin typeface="Courier New" panose="02070309020205020404" pitchFamily="49" charset="0"/>
+                <a:cs typeface="Courier New" panose="02070309020205020404" pitchFamily="49" charset="0"/>
+              </a:rPr>
+              <a:t> augment /</a:t>
+            </a:r>
+            <a:r>
+              <a:rPr lang="en-US" sz="900" dirty="0" err="1">
+                <a:latin typeface="Courier New" panose="02070309020205020404" pitchFamily="49" charset="0"/>
+                <a:cs typeface="Courier New" panose="02070309020205020404" pitchFamily="49" charset="0"/>
+              </a:rPr>
+              <a:t>nw:networks</a:t>
+            </a:r>
+            <a:r>
+              <a:rPr lang="en-US" sz="900" dirty="0">
+                <a:latin typeface="Courier New" panose="02070309020205020404" pitchFamily="49" charset="0"/>
+                <a:cs typeface="Courier New" panose="02070309020205020404" pitchFamily="49" charset="0"/>
+              </a:rPr>
+              <a:t>/</a:t>
+            </a:r>
+            <a:r>
+              <a:rPr lang="en-US" sz="900" dirty="0" err="1">
+                <a:latin typeface="Courier New" panose="02070309020205020404" pitchFamily="49" charset="0"/>
+                <a:cs typeface="Courier New" panose="02070309020205020404" pitchFamily="49" charset="0"/>
+              </a:rPr>
+              <a:t>nw:network</a:t>
+            </a:r>
+            <a:r>
+              <a:rPr lang="en-US" sz="900" dirty="0">
+                <a:latin typeface="Courier New" panose="02070309020205020404" pitchFamily="49" charset="0"/>
+                <a:cs typeface="Courier New" panose="02070309020205020404" pitchFamily="49" charset="0"/>
+              </a:rPr>
+              <a:t>/</a:t>
+            </a:r>
+            <a:r>
+              <a:rPr lang="en-US" sz="900" dirty="0" err="1">
+                <a:latin typeface="Courier New" panose="02070309020205020404" pitchFamily="49" charset="0"/>
+                <a:cs typeface="Courier New" panose="02070309020205020404" pitchFamily="49" charset="0"/>
+              </a:rPr>
+              <a:t>nw:node</a:t>
+            </a:r>
+            <a:r>
+              <a:rPr lang="en-US" sz="900" dirty="0">
+                <a:latin typeface="Courier New" panose="02070309020205020404" pitchFamily="49" charset="0"/>
+                <a:cs typeface="Courier New" panose="02070309020205020404" pitchFamily="49" charset="0"/>
+              </a:rPr>
+              <a:t>:</a:t>
+            </a:r>
+          </a:p>
+          <a:p>
+            <a:r>
+              <a:rPr lang="en-US" sz="900" dirty="0">
+                <a:latin typeface="Courier New" panose="02070309020205020404" pitchFamily="49" charset="0"/>
+                <a:cs typeface="Courier New" panose="02070309020205020404" pitchFamily="49" charset="0"/>
+              </a:rPr>
+              <a:t>    +--</a:t>
+            </a:r>
+            <a:r>
+              <a:rPr lang="en-US" sz="900" dirty="0" err="1">
+                <a:latin typeface="Courier New" panose="02070309020205020404" pitchFamily="49" charset="0"/>
+                <a:cs typeface="Courier New" panose="02070309020205020404" pitchFamily="49" charset="0"/>
+              </a:rPr>
+              <a:t>rw</a:t>
+            </a:r>
+            <a:r>
+              <a:rPr lang="en-US" sz="900" dirty="0">
+                <a:latin typeface="Courier New" panose="02070309020205020404" pitchFamily="49" charset="0"/>
+                <a:cs typeface="Courier New" panose="02070309020205020404" pitchFamily="49" charset="0"/>
+              </a:rPr>
+              <a:t> </a:t>
+            </a:r>
+            <a:r>
+              <a:rPr lang="en-US" sz="900" dirty="0" err="1">
+                <a:latin typeface="Courier New" panose="02070309020205020404" pitchFamily="49" charset="0"/>
+                <a:cs typeface="Courier New" panose="02070309020205020404" pitchFamily="49" charset="0"/>
+              </a:rPr>
+              <a:t>te</a:t>
+            </a:r>
+            <a:r>
+              <a:rPr lang="en-US" sz="900" dirty="0">
+                <a:latin typeface="Courier New" panose="02070309020205020404" pitchFamily="49" charset="0"/>
+                <a:cs typeface="Courier New" panose="02070309020205020404" pitchFamily="49" charset="0"/>
+              </a:rPr>
+              <a:t>-node-id?   </a:t>
+            </a:r>
+            <a:r>
+              <a:rPr lang="en-US" sz="900" dirty="0" err="1">
+                <a:latin typeface="Courier New" panose="02070309020205020404" pitchFamily="49" charset="0"/>
+                <a:cs typeface="Courier New" panose="02070309020205020404" pitchFamily="49" charset="0"/>
+              </a:rPr>
+              <a:t>te-types:te-node-id</a:t>
+            </a:r>
+            <a:endParaRPr lang="en-US" sz="900" dirty="0">
+              <a:latin typeface="Courier New" panose="02070309020205020404" pitchFamily="49" charset="0"/>
+              <a:cs typeface="Courier New" panose="02070309020205020404" pitchFamily="49" charset="0"/>
+            </a:endParaRPr>
+          </a:p>
+          <a:p>
+            <a:r>
+              <a:rPr lang="en-US" sz="900" dirty="0">
+                <a:latin typeface="Courier New" panose="02070309020205020404" pitchFamily="49" charset="0"/>
+                <a:cs typeface="Courier New" panose="02070309020205020404" pitchFamily="49" charset="0"/>
+              </a:rPr>
+              <a:t>    +--</a:t>
+            </a:r>
+            <a:r>
+              <a:rPr lang="en-US" sz="900" dirty="0" err="1">
+                <a:latin typeface="Courier New" panose="02070309020205020404" pitchFamily="49" charset="0"/>
+                <a:cs typeface="Courier New" panose="02070309020205020404" pitchFamily="49" charset="0"/>
+              </a:rPr>
+              <a:t>rw</a:t>
+            </a:r>
+            <a:r>
+              <a:rPr lang="en-US" sz="900" dirty="0">
+                <a:latin typeface="Courier New" panose="02070309020205020404" pitchFamily="49" charset="0"/>
+                <a:cs typeface="Courier New" panose="02070309020205020404" pitchFamily="49" charset="0"/>
+              </a:rPr>
+              <a:t> </a:t>
+            </a:r>
+            <a:r>
+              <a:rPr lang="en-US" sz="900" dirty="0" err="1">
+                <a:latin typeface="Courier New" panose="02070309020205020404" pitchFamily="49" charset="0"/>
+                <a:cs typeface="Courier New" panose="02070309020205020404" pitchFamily="49" charset="0"/>
+              </a:rPr>
+              <a:t>te</a:t>
+            </a:r>
+            <a:r>
+              <a:rPr lang="en-US" sz="900" dirty="0">
+                <a:latin typeface="Courier New" panose="02070309020205020404" pitchFamily="49" charset="0"/>
+                <a:cs typeface="Courier New" panose="02070309020205020404" pitchFamily="49" charset="0"/>
+              </a:rPr>
+              <a:t>!</a:t>
+            </a:r>
+          </a:p>
+          <a:p>
+            <a:r>
+              <a:rPr lang="en-US" sz="900" dirty="0">
+                <a:latin typeface="Courier New" panose="02070309020205020404" pitchFamily="49" charset="0"/>
+                <a:cs typeface="Courier New" panose="02070309020205020404" pitchFamily="49" charset="0"/>
+              </a:rPr>
+              <a:t>       +--</a:t>
+            </a:r>
+            <a:r>
+              <a:rPr lang="en-US" sz="900" dirty="0" err="1">
+                <a:latin typeface="Courier New" panose="02070309020205020404" pitchFamily="49" charset="0"/>
+                <a:cs typeface="Courier New" panose="02070309020205020404" pitchFamily="49" charset="0"/>
+              </a:rPr>
+              <a:t>rw</a:t>
+            </a:r>
+            <a:r>
+              <a:rPr lang="en-US" sz="900" dirty="0">
+                <a:latin typeface="Courier New" panose="02070309020205020404" pitchFamily="49" charset="0"/>
+                <a:cs typeface="Courier New" panose="02070309020205020404" pitchFamily="49" charset="0"/>
+              </a:rPr>
+              <a:t> </a:t>
+            </a:r>
+            <a:r>
+              <a:rPr lang="en-US" sz="900" dirty="0" err="1">
+                <a:latin typeface="Courier New" panose="02070309020205020404" pitchFamily="49" charset="0"/>
+                <a:cs typeface="Courier New" panose="02070309020205020404" pitchFamily="49" charset="0"/>
+              </a:rPr>
+              <a:t>te</a:t>
+            </a:r>
+            <a:r>
+              <a:rPr lang="en-US" sz="900" dirty="0">
+                <a:latin typeface="Courier New" panose="02070309020205020404" pitchFamily="49" charset="0"/>
+                <a:cs typeface="Courier New" panose="02070309020205020404" pitchFamily="49" charset="0"/>
+              </a:rPr>
+              <a:t>-node-attributes</a:t>
+            </a:r>
+          </a:p>
+          <a:p>
+            <a:r>
+              <a:rPr lang="en-US" sz="900" dirty="0">
+                <a:latin typeface="Courier New" panose="02070309020205020404" pitchFamily="49" charset="0"/>
+                <a:cs typeface="Courier New" panose="02070309020205020404" pitchFamily="49" charset="0"/>
+              </a:rPr>
+              <a:t>       |  +--</a:t>
+            </a:r>
+            <a:r>
+              <a:rPr lang="en-US" sz="900" dirty="0" err="1">
+                <a:latin typeface="Courier New" panose="02070309020205020404" pitchFamily="49" charset="0"/>
+                <a:cs typeface="Courier New" panose="02070309020205020404" pitchFamily="49" charset="0"/>
+              </a:rPr>
+              <a:t>rw</a:t>
+            </a:r>
+            <a:r>
+              <a:rPr lang="en-US" sz="900" dirty="0">
+                <a:latin typeface="Courier New" panose="02070309020205020404" pitchFamily="49" charset="0"/>
+                <a:cs typeface="Courier New" panose="02070309020205020404" pitchFamily="49" charset="0"/>
+              </a:rPr>
+              <a:t> admin-status?            </a:t>
+            </a:r>
+            <a:r>
+              <a:rPr lang="en-US" sz="900" dirty="0" err="1">
+                <a:latin typeface="Courier New" panose="02070309020205020404" pitchFamily="49" charset="0"/>
+                <a:cs typeface="Courier New" panose="02070309020205020404" pitchFamily="49" charset="0"/>
+              </a:rPr>
+              <a:t>te-types:te-admin-status</a:t>
+            </a:r>
+            <a:endParaRPr lang="en-US" sz="900" dirty="0">
+              <a:latin typeface="Courier New" panose="02070309020205020404" pitchFamily="49" charset="0"/>
+              <a:cs typeface="Courier New" panose="02070309020205020404" pitchFamily="49" charset="0"/>
+            </a:endParaRPr>
+          </a:p>
+          <a:p>
+            <a:r>
+              <a:rPr lang="en-US" sz="900" dirty="0">
+                <a:latin typeface="Courier New" panose="02070309020205020404" pitchFamily="49" charset="0"/>
+                <a:cs typeface="Courier New" panose="02070309020205020404" pitchFamily="49" charset="0"/>
+              </a:rPr>
+              <a:t>       |  +--</a:t>
+            </a:r>
+            <a:r>
+              <a:rPr lang="en-US" sz="900" dirty="0" err="1">
+                <a:latin typeface="Courier New" panose="02070309020205020404" pitchFamily="49" charset="0"/>
+                <a:cs typeface="Courier New" panose="02070309020205020404" pitchFamily="49" charset="0"/>
+              </a:rPr>
+              <a:t>rw</a:t>
+            </a:r>
+            <a:r>
+              <a:rPr lang="en-US" sz="900" dirty="0">
+                <a:latin typeface="Courier New" panose="02070309020205020404" pitchFamily="49" charset="0"/>
+                <a:cs typeface="Courier New" panose="02070309020205020404" pitchFamily="49" charset="0"/>
+              </a:rPr>
+              <a:t> activated           </a:t>
+            </a:r>
+            <a:r>
+              <a:rPr lang="en-US" sz="900" dirty="0" err="1">
+                <a:latin typeface="Courier New" panose="02070309020205020404" pitchFamily="49" charset="0"/>
+                <a:cs typeface="Courier New" panose="02070309020205020404" pitchFamily="49" charset="0"/>
+              </a:rPr>
+              <a:t>boolean</a:t>
+            </a:r>
+            <a:r>
+              <a:rPr lang="en-US" sz="900" dirty="0">
+                <a:latin typeface="Courier New" panose="02070309020205020404" pitchFamily="49" charset="0"/>
+                <a:cs typeface="Courier New" panose="02070309020205020404" pitchFamily="49" charset="0"/>
+              </a:rPr>
+              <a:t>            &lt;== augmentation</a:t>
+            </a:r>
+          </a:p>
+          <a:p>
+            <a:r>
+              <a:rPr lang="en-US" sz="900" dirty="0">
+                <a:latin typeface="Courier New" panose="02070309020205020404" pitchFamily="49" charset="0"/>
+                <a:cs typeface="Courier New" panose="02070309020205020404" pitchFamily="49" charset="0"/>
+              </a:rPr>
+              <a:t>       |  +--</a:t>
+            </a:r>
+            <a:r>
+              <a:rPr lang="en-US" sz="900" dirty="0" err="1">
+                <a:latin typeface="Courier New" panose="02070309020205020404" pitchFamily="49" charset="0"/>
+                <a:cs typeface="Courier New" panose="02070309020205020404" pitchFamily="49" charset="0"/>
+              </a:rPr>
+              <a:t>rw</a:t>
+            </a:r>
+            <a:r>
+              <a:rPr lang="en-US" sz="900" dirty="0">
+                <a:latin typeface="Courier New" panose="02070309020205020404" pitchFamily="49" charset="0"/>
+                <a:cs typeface="Courier New" panose="02070309020205020404" pitchFamily="49" charset="0"/>
+              </a:rPr>
+              <a:t> connectivity-matrices</a:t>
+            </a:r>
+          </a:p>
+          <a:p>
+            <a:r>
+              <a:rPr lang="en-US" sz="900" dirty="0">
+                <a:latin typeface="Courier New" panose="02070309020205020404" pitchFamily="49" charset="0"/>
+                <a:cs typeface="Courier New" panose="02070309020205020404" pitchFamily="49" charset="0"/>
+              </a:rPr>
+              <a:t>       |  |  +--</a:t>
+            </a:r>
+            <a:r>
+              <a:rPr lang="en-US" sz="900" dirty="0" err="1">
+                <a:latin typeface="Courier New" panose="02070309020205020404" pitchFamily="49" charset="0"/>
+                <a:cs typeface="Courier New" panose="02070309020205020404" pitchFamily="49" charset="0"/>
+              </a:rPr>
+              <a:t>rw</a:t>
+            </a:r>
+            <a:r>
+              <a:rPr lang="en-US" sz="900" dirty="0">
+                <a:latin typeface="Courier New" panose="02070309020205020404" pitchFamily="49" charset="0"/>
+                <a:cs typeface="Courier New" panose="02070309020205020404" pitchFamily="49" charset="0"/>
+              </a:rPr>
+              <a:t> connectivity-matrix* [id]</a:t>
+            </a:r>
+          </a:p>
+          <a:p>
+            <a:r>
+              <a:rPr lang="en-US" sz="900" dirty="0">
+                <a:latin typeface="Courier New" panose="02070309020205020404" pitchFamily="49" charset="0"/>
+                <a:cs typeface="Courier New" panose="02070309020205020404" pitchFamily="49" charset="0"/>
+              </a:rPr>
+              <a:t>       |  |     +--</a:t>
+            </a:r>
+            <a:r>
+              <a:rPr lang="en-US" sz="900" dirty="0" err="1">
+                <a:latin typeface="Courier New" panose="02070309020205020404" pitchFamily="49" charset="0"/>
+                <a:cs typeface="Courier New" panose="02070309020205020404" pitchFamily="49" charset="0"/>
+              </a:rPr>
+              <a:t>rw</a:t>
+            </a:r>
+            <a:r>
+              <a:rPr lang="en-US" sz="900" dirty="0">
+                <a:latin typeface="Courier New" panose="02070309020205020404" pitchFamily="49" charset="0"/>
+                <a:cs typeface="Courier New" panose="02070309020205020404" pitchFamily="49" charset="0"/>
+              </a:rPr>
+              <a:t> id                  uint32</a:t>
+            </a:r>
+          </a:p>
+          <a:p>
+            <a:r>
+              <a:rPr lang="en-US" sz="900" dirty="0">
+                <a:latin typeface="Courier New" panose="02070309020205020404" pitchFamily="49" charset="0"/>
+                <a:cs typeface="Courier New" panose="02070309020205020404" pitchFamily="49" charset="0"/>
+              </a:rPr>
+              <a:t>       |  |     +--</a:t>
+            </a:r>
+            <a:r>
+              <a:rPr lang="en-US" sz="900" dirty="0" err="1">
+                <a:latin typeface="Courier New" panose="02070309020205020404" pitchFamily="49" charset="0"/>
+                <a:cs typeface="Courier New" panose="02070309020205020404" pitchFamily="49" charset="0"/>
+              </a:rPr>
+              <a:t>rw</a:t>
+            </a:r>
+            <a:r>
+              <a:rPr lang="en-US" sz="900" dirty="0">
+                <a:latin typeface="Courier New" panose="02070309020205020404" pitchFamily="49" charset="0"/>
+                <a:cs typeface="Courier New" panose="02070309020205020404" pitchFamily="49" charset="0"/>
+              </a:rPr>
+              <a:t> activated           </a:t>
+            </a:r>
+            <a:r>
+              <a:rPr lang="en-US" sz="900" dirty="0" err="1">
+                <a:latin typeface="Courier New" panose="02070309020205020404" pitchFamily="49" charset="0"/>
+                <a:cs typeface="Courier New" panose="02070309020205020404" pitchFamily="49" charset="0"/>
+              </a:rPr>
+              <a:t>boolean</a:t>
+            </a:r>
+            <a:r>
+              <a:rPr lang="en-US" sz="900" dirty="0">
+                <a:latin typeface="Courier New" panose="02070309020205020404" pitchFamily="49" charset="0"/>
+                <a:cs typeface="Courier New" panose="02070309020205020404" pitchFamily="49" charset="0"/>
+              </a:rPr>
+              <a:t>      &lt;== augmentation</a:t>
+            </a:r>
+          </a:p>
+        </p:txBody>
+      </p:sp>
+    </p:spTree>
+    <p:extLst>
+      <p:ext uri="{BB962C8B-B14F-4D97-AF65-F5344CB8AC3E}">
+        <p14:creationId xmlns:p14="http://schemas.microsoft.com/office/powerpoint/2010/main" val="528846083"/>
+      </p:ext>
+    </p:extLst>
+  </p:cSld>
+  <p:clrMapOvr>
+    <a:masterClrMapping/>
+  </p:clrMapOvr>
+</p:sld>
+</file>
+
+<file path=ppt/slides/slide25.xml><?xml version="1.0" encoding="utf-8"?>
+<p:sld xmlns:a="http://schemas.openxmlformats.org/drawingml/2006/main" xmlns:r="http://schemas.openxmlformats.org/officeDocument/2006/relationships" xmlns:p="http://schemas.openxmlformats.org/presentationml/2006/main">
+  <p:cSld>
+    <p:spTree>
+      <p:nvGrpSpPr>
+        <p:cNvPr id="1" name=""/>
+        <p:cNvGrpSpPr/>
+        <p:nvPr/>
+      </p:nvGrpSpPr>
+      <p:grpSpPr>
+        <a:xfrm>
+          <a:off x="0" y="0"/>
+          <a:ext cx="0" cy="0"/>
+          <a:chOff x="0" y="0"/>
+          <a:chExt cx="0" cy="0"/>
+        </a:xfrm>
+      </p:grpSpPr>
+      <p:sp>
+        <p:nvSpPr>
+          <p:cNvPr id="2" name="Title 1">
+            <a:extLst>
+              <a:ext uri="{FF2B5EF4-FFF2-40B4-BE49-F238E27FC236}">
+                <a16:creationId xmlns:a16="http://schemas.microsoft.com/office/drawing/2014/main" id="{EB3E31FD-1C2F-48A6-AB51-148D4276F8C0}"/>
+              </a:ext>
+            </a:extLst>
+          </p:cNvPr>
+          <p:cNvSpPr>
+            <a:spLocks noGrp="1"/>
+          </p:cNvSpPr>
+          <p:nvPr>
+            <p:ph type="title"/>
+          </p:nvPr>
+        </p:nvSpPr>
+        <p:spPr>
+          <a:xfrm>
+            <a:off x="457200" y="114300"/>
+            <a:ext cx="8229600" cy="533665"/>
+          </a:xfrm>
+        </p:spPr>
+        <p:txBody>
+          <a:bodyPr>
+            <a:noAutofit/>
+          </a:bodyPr>
+          <a:lstStyle/>
+          <a:p>
+            <a:r>
+              <a:rPr lang="en-US" sz="3200" dirty="0"/>
+              <a:t>Generic Model Proposal (</a:t>
+            </a:r>
+            <a:r>
+              <a:rPr lang="en-US" sz="3200" dirty="0" err="1"/>
+              <a:t>VN+draft-liu</a:t>
+            </a:r>
+            <a:r>
+              <a:rPr lang="en-US" sz="3200" dirty="0"/>
+              <a:t>)</a:t>
+            </a:r>
+          </a:p>
+        </p:txBody>
+      </p:sp>
+      <p:sp>
+        <p:nvSpPr>
+          <p:cNvPr id="5" name="TextBox 4">
+            <a:extLst>
+              <a:ext uri="{FF2B5EF4-FFF2-40B4-BE49-F238E27FC236}">
+                <a16:creationId xmlns:a16="http://schemas.microsoft.com/office/drawing/2014/main" id="{803439C6-F6EA-49D4-93F8-47A194FA2D42}"/>
+              </a:ext>
+            </a:extLst>
+          </p:cNvPr>
+          <p:cNvSpPr txBox="1"/>
+          <p:nvPr/>
+        </p:nvSpPr>
+        <p:spPr>
+          <a:xfrm>
+            <a:off x="914400" y="775186"/>
+            <a:ext cx="7924800" cy="4939814"/>
+          </a:xfrm>
+          <a:prstGeom prst="rect">
+            <a:avLst/>
+          </a:prstGeom>
+          <a:noFill/>
+        </p:spPr>
+        <p:txBody>
+          <a:bodyPr wrap="square">
+            <a:spAutoFit/>
+          </a:bodyPr>
+          <a:lstStyle/>
+          <a:p>
+            <a:r>
+              <a:rPr lang="en-US" sz="900" dirty="0">
+                <a:latin typeface="Courier New" panose="02070309020205020404" pitchFamily="49" charset="0"/>
+                <a:cs typeface="Courier New" panose="02070309020205020404" pitchFamily="49" charset="0"/>
+              </a:rPr>
+              <a:t>module: </a:t>
+            </a:r>
+            <a:r>
+              <a:rPr lang="en-US" sz="900" dirty="0" err="1">
+                <a:latin typeface="Courier New" panose="02070309020205020404" pitchFamily="49" charset="0"/>
+                <a:cs typeface="Courier New" panose="02070309020205020404" pitchFamily="49" charset="0"/>
+              </a:rPr>
+              <a:t>ietf</a:t>
+            </a:r>
+            <a:r>
+              <a:rPr lang="en-US" sz="900" dirty="0">
+                <a:latin typeface="Courier New" panose="02070309020205020404" pitchFamily="49" charset="0"/>
+                <a:cs typeface="Courier New" panose="02070309020205020404" pitchFamily="49" charset="0"/>
+              </a:rPr>
+              <a:t>-ns-generic</a:t>
+            </a:r>
+          </a:p>
+          <a:p>
+            <a:r>
+              <a:rPr lang="en-US" sz="900" dirty="0">
+                <a:latin typeface="Courier New" panose="02070309020205020404" pitchFamily="49" charset="0"/>
+                <a:cs typeface="Courier New" panose="02070309020205020404" pitchFamily="49" charset="0"/>
+              </a:rPr>
+              <a:t>     +--</a:t>
+            </a:r>
+            <a:r>
+              <a:rPr lang="en-US" sz="900" dirty="0" err="1">
+                <a:latin typeface="Courier New" panose="02070309020205020404" pitchFamily="49" charset="0"/>
+                <a:cs typeface="Courier New" panose="02070309020205020404" pitchFamily="49" charset="0"/>
+              </a:rPr>
+              <a:t>rw</a:t>
+            </a:r>
+            <a:r>
+              <a:rPr lang="en-US" sz="900" dirty="0">
+                <a:latin typeface="Courier New" panose="02070309020205020404" pitchFamily="49" charset="0"/>
+                <a:cs typeface="Courier New" panose="02070309020205020404" pitchFamily="49" charset="0"/>
+              </a:rPr>
+              <a:t> access-point</a:t>
+            </a:r>
+          </a:p>
+          <a:p>
+            <a:r>
+              <a:rPr lang="en-US" sz="900" dirty="0">
+                <a:latin typeface="Courier New" panose="02070309020205020404" pitchFamily="49" charset="0"/>
+                <a:cs typeface="Courier New" panose="02070309020205020404" pitchFamily="49" charset="0"/>
+              </a:rPr>
+              <a:t>     |  +--</a:t>
+            </a:r>
+            <a:r>
+              <a:rPr lang="en-US" sz="900" dirty="0" err="1">
+                <a:latin typeface="Courier New" panose="02070309020205020404" pitchFamily="49" charset="0"/>
+                <a:cs typeface="Courier New" panose="02070309020205020404" pitchFamily="49" charset="0"/>
+              </a:rPr>
+              <a:t>rw</a:t>
+            </a:r>
+            <a:r>
+              <a:rPr lang="en-US" sz="900" dirty="0">
+                <a:latin typeface="Courier New" panose="02070309020205020404" pitchFamily="49" charset="0"/>
+                <a:cs typeface="Courier New" panose="02070309020205020404" pitchFamily="49" charset="0"/>
+              </a:rPr>
+              <a:t> ap* [ap-id]</a:t>
+            </a:r>
+          </a:p>
+          <a:p>
+            <a:r>
+              <a:rPr lang="en-US" sz="900" dirty="0">
+                <a:latin typeface="Courier New" panose="02070309020205020404" pitchFamily="49" charset="0"/>
+                <a:cs typeface="Courier New" panose="02070309020205020404" pitchFamily="49" charset="0"/>
+              </a:rPr>
+              <a:t>     |     +--</a:t>
+            </a:r>
+            <a:r>
+              <a:rPr lang="en-US" sz="900" dirty="0" err="1">
+                <a:latin typeface="Courier New" panose="02070309020205020404" pitchFamily="49" charset="0"/>
+                <a:cs typeface="Courier New" panose="02070309020205020404" pitchFamily="49" charset="0"/>
+              </a:rPr>
+              <a:t>rw</a:t>
+            </a:r>
+            <a:r>
+              <a:rPr lang="en-US" sz="900" dirty="0">
+                <a:latin typeface="Courier New" panose="02070309020205020404" pitchFamily="49" charset="0"/>
+                <a:cs typeface="Courier New" panose="02070309020205020404" pitchFamily="49" charset="0"/>
+              </a:rPr>
+              <a:t> ap-id            </a:t>
+            </a:r>
+            <a:r>
+              <a:rPr lang="en-US" sz="900" dirty="0" err="1">
+                <a:latin typeface="Courier New" panose="02070309020205020404" pitchFamily="49" charset="0"/>
+                <a:cs typeface="Courier New" panose="02070309020205020404" pitchFamily="49" charset="0"/>
+              </a:rPr>
+              <a:t>ap-id</a:t>
+            </a:r>
+            <a:r>
+              <a:rPr lang="en-US" sz="900" dirty="0">
+                <a:latin typeface="Courier New" panose="02070309020205020404" pitchFamily="49" charset="0"/>
+                <a:cs typeface="Courier New" panose="02070309020205020404" pitchFamily="49" charset="0"/>
+              </a:rPr>
+              <a:t>                   //access point id (pre-negotiated between CE-PE)</a:t>
+            </a:r>
+          </a:p>
+          <a:p>
+            <a:r>
+              <a:rPr lang="en-US" sz="900" dirty="0">
+                <a:latin typeface="Courier New" panose="02070309020205020404" pitchFamily="49" charset="0"/>
+                <a:cs typeface="Courier New" panose="02070309020205020404" pitchFamily="49" charset="0"/>
+              </a:rPr>
+              <a:t>     |     +--</a:t>
+            </a:r>
+            <a:r>
+              <a:rPr lang="en-US" sz="900" dirty="0" err="1">
+                <a:latin typeface="Courier New" panose="02070309020205020404" pitchFamily="49" charset="0"/>
+                <a:cs typeface="Courier New" panose="02070309020205020404" pitchFamily="49" charset="0"/>
+              </a:rPr>
+              <a:t>rw</a:t>
+            </a:r>
+            <a:r>
+              <a:rPr lang="en-US" sz="900" dirty="0">
+                <a:latin typeface="Courier New" panose="02070309020205020404" pitchFamily="49" charset="0"/>
+                <a:cs typeface="Courier New" panose="02070309020205020404" pitchFamily="49" charset="0"/>
+              </a:rPr>
+              <a:t> pe-node-id       string	                  //PE node identifier</a:t>
+            </a:r>
+          </a:p>
+          <a:p>
+            <a:r>
+              <a:rPr lang="en-US" sz="900" dirty="0">
+                <a:latin typeface="Courier New" panose="02070309020205020404" pitchFamily="49" charset="0"/>
+                <a:cs typeface="Courier New" panose="02070309020205020404" pitchFamily="49" charset="0"/>
+              </a:rPr>
+              <a:t>     +--</a:t>
+            </a:r>
+            <a:r>
+              <a:rPr lang="en-US" sz="900" dirty="0" err="1">
+                <a:latin typeface="Courier New" panose="02070309020205020404" pitchFamily="49" charset="0"/>
+                <a:cs typeface="Courier New" panose="02070309020205020404" pitchFamily="49" charset="0"/>
+              </a:rPr>
+              <a:t>rw</a:t>
+            </a:r>
+            <a:r>
+              <a:rPr lang="en-US" sz="900" dirty="0">
+                <a:latin typeface="Courier New" panose="02070309020205020404" pitchFamily="49" charset="0"/>
+                <a:cs typeface="Courier New" panose="02070309020205020404" pitchFamily="49" charset="0"/>
+              </a:rPr>
+              <a:t> network-slice*         [ns-id]</a:t>
+            </a:r>
+          </a:p>
+          <a:p>
+            <a:r>
+              <a:rPr lang="en-US" sz="900" dirty="0">
+                <a:latin typeface="Courier New" panose="02070309020205020404" pitchFamily="49" charset="0"/>
+                <a:cs typeface="Courier New" panose="02070309020205020404" pitchFamily="49" charset="0"/>
+              </a:rPr>
+              <a:t>         +--</a:t>
+            </a:r>
+            <a:r>
+              <a:rPr lang="en-US" sz="900" dirty="0" err="1">
+                <a:latin typeface="Courier New" panose="02070309020205020404" pitchFamily="49" charset="0"/>
+                <a:cs typeface="Courier New" panose="02070309020205020404" pitchFamily="49" charset="0"/>
+              </a:rPr>
+              <a:t>rw</a:t>
+            </a:r>
+            <a:r>
+              <a:rPr lang="en-US" sz="900" dirty="0">
+                <a:latin typeface="Courier New" panose="02070309020205020404" pitchFamily="49" charset="0"/>
+                <a:cs typeface="Courier New" panose="02070309020205020404" pitchFamily="49" charset="0"/>
+              </a:rPr>
+              <a:t> ns-id              string</a:t>
+            </a:r>
+          </a:p>
+          <a:p>
+            <a:r>
+              <a:rPr lang="en-US" sz="900" dirty="0">
+                <a:latin typeface="Courier New" panose="02070309020205020404" pitchFamily="49" charset="0"/>
+                <a:cs typeface="Courier New" panose="02070309020205020404" pitchFamily="49" charset="0"/>
+              </a:rPr>
+              <a:t>         +--</a:t>
+            </a:r>
+            <a:r>
+              <a:rPr lang="en-US" sz="900" dirty="0" err="1">
+                <a:latin typeface="Courier New" panose="02070309020205020404" pitchFamily="49" charset="0"/>
+                <a:cs typeface="Courier New" panose="02070309020205020404" pitchFamily="49" charset="0"/>
+              </a:rPr>
+              <a:t>rw</a:t>
+            </a:r>
+            <a:r>
+              <a:rPr lang="en-US" sz="900" dirty="0">
+                <a:latin typeface="Courier New" panose="02070309020205020404" pitchFamily="49" charset="0"/>
+                <a:cs typeface="Courier New" panose="02070309020205020404" pitchFamily="49" charset="0"/>
+              </a:rPr>
+              <a:t> ns-description     string           </a:t>
+            </a:r>
+          </a:p>
+          <a:p>
+            <a:r>
+              <a:rPr lang="en-US" sz="900" dirty="0">
+                <a:latin typeface="Courier New" panose="02070309020205020404" pitchFamily="49" charset="0"/>
+                <a:cs typeface="Courier New" panose="02070309020205020404" pitchFamily="49" charset="0"/>
+              </a:rPr>
+              <a:t>         +--</a:t>
+            </a:r>
+            <a:r>
+              <a:rPr lang="en-US" sz="900" dirty="0" err="1">
+                <a:latin typeface="Courier New" panose="02070309020205020404" pitchFamily="49" charset="0"/>
+                <a:cs typeface="Courier New" panose="02070309020205020404" pitchFamily="49" charset="0"/>
+              </a:rPr>
+              <a:t>rw</a:t>
+            </a:r>
+            <a:r>
+              <a:rPr lang="en-US" sz="900" dirty="0">
+                <a:latin typeface="Courier New" panose="02070309020205020404" pitchFamily="49" charset="0"/>
+                <a:cs typeface="Courier New" panose="02070309020205020404" pitchFamily="49" charset="0"/>
+              </a:rPr>
+              <a:t> customer-name*     string          </a:t>
+            </a:r>
+          </a:p>
+          <a:p>
+            <a:r>
+              <a:rPr lang="en-US" sz="900" dirty="0">
+                <a:latin typeface="Courier New" panose="02070309020205020404" pitchFamily="49" charset="0"/>
+                <a:cs typeface="Courier New" panose="02070309020205020404" pitchFamily="49" charset="0"/>
+              </a:rPr>
+              <a:t>         +--</a:t>
+            </a:r>
+            <a:r>
+              <a:rPr lang="en-US" sz="900" dirty="0" err="1">
+                <a:latin typeface="Courier New" panose="02070309020205020404" pitchFamily="49" charset="0"/>
+                <a:cs typeface="Courier New" panose="02070309020205020404" pitchFamily="49" charset="0"/>
+              </a:rPr>
+              <a:t>rw</a:t>
+            </a:r>
+            <a:r>
+              <a:rPr lang="en-US" sz="900" dirty="0">
+                <a:latin typeface="Courier New" panose="02070309020205020404" pitchFamily="49" charset="0"/>
+                <a:cs typeface="Courier New" panose="02070309020205020404" pitchFamily="49" charset="0"/>
+              </a:rPr>
+              <a:t> ns-type?           </a:t>
+            </a:r>
+            <a:r>
+              <a:rPr lang="en-US" sz="900" dirty="0" err="1">
+                <a:latin typeface="Courier New" panose="02070309020205020404" pitchFamily="49" charset="0"/>
+                <a:cs typeface="Courier New" panose="02070309020205020404" pitchFamily="49" charset="0"/>
+              </a:rPr>
+              <a:t>identityref</a:t>
+            </a:r>
+            <a:r>
+              <a:rPr lang="en-US" sz="900" dirty="0">
+                <a:latin typeface="Courier New" panose="02070309020205020404" pitchFamily="49" charset="0"/>
+                <a:cs typeface="Courier New" panose="02070309020205020404" pitchFamily="49" charset="0"/>
+              </a:rPr>
+              <a:t>             // type of network slice: type 1 or type 2</a:t>
+            </a:r>
+          </a:p>
+          <a:p>
+            <a:r>
+              <a:rPr lang="en-US" sz="900" dirty="0">
+                <a:latin typeface="Courier New" panose="02070309020205020404" pitchFamily="49" charset="0"/>
+                <a:cs typeface="Courier New" panose="02070309020205020404" pitchFamily="49" charset="0"/>
+              </a:rPr>
+              <a:t>         +--</a:t>
+            </a:r>
+            <a:r>
+              <a:rPr lang="en-US" sz="900" dirty="0" err="1">
+                <a:latin typeface="Courier New" panose="02070309020205020404" pitchFamily="49" charset="0"/>
+                <a:cs typeface="Courier New" panose="02070309020205020404" pitchFamily="49" charset="0"/>
+              </a:rPr>
+              <a:t>rw</a:t>
+            </a:r>
+            <a:r>
+              <a:rPr lang="en-US" sz="900" dirty="0">
+                <a:latin typeface="Courier New" panose="02070309020205020404" pitchFamily="49" charset="0"/>
+                <a:cs typeface="Courier New" panose="02070309020205020404" pitchFamily="49" charset="0"/>
+              </a:rPr>
+              <a:t> </a:t>
+            </a:r>
+            <a:r>
+              <a:rPr lang="en-US" sz="900" dirty="0" err="1">
+                <a:latin typeface="Courier New" panose="02070309020205020404" pitchFamily="49" charset="0"/>
+                <a:cs typeface="Courier New" panose="02070309020205020404" pitchFamily="49" charset="0"/>
+              </a:rPr>
+              <a:t>slo</a:t>
+            </a:r>
+            <a:r>
+              <a:rPr lang="en-US" sz="900" dirty="0">
+                <a:latin typeface="Courier New" panose="02070309020205020404" pitchFamily="49" charset="0"/>
+                <a:cs typeface="Courier New" panose="02070309020205020404" pitchFamily="49" charset="0"/>
+              </a:rPr>
+              <a:t>                                        // SLO/SLE policy of the network slice</a:t>
+            </a:r>
+          </a:p>
+          <a:p>
+            <a:r>
+              <a:rPr lang="en-US" sz="900" dirty="0">
+                <a:latin typeface="Courier New" panose="02070309020205020404" pitchFamily="49" charset="0"/>
+                <a:cs typeface="Courier New" panose="02070309020205020404" pitchFamily="49" charset="0"/>
+              </a:rPr>
+              <a:t>         |  +-- ...</a:t>
+            </a:r>
+          </a:p>
+          <a:p>
+            <a:r>
+              <a:rPr lang="en-US" sz="900" dirty="0">
+                <a:latin typeface="Courier New" panose="02070309020205020404" pitchFamily="49" charset="0"/>
+                <a:cs typeface="Courier New" panose="02070309020205020404" pitchFamily="49" charset="0"/>
+              </a:rPr>
+              <a:t>         +--</a:t>
+            </a:r>
+            <a:r>
+              <a:rPr lang="en-US" sz="900" dirty="0" err="1">
+                <a:latin typeface="Courier New" panose="02070309020205020404" pitchFamily="49" charset="0"/>
+                <a:cs typeface="Courier New" panose="02070309020205020404" pitchFamily="49" charset="0"/>
+              </a:rPr>
+              <a:t>rw</a:t>
+            </a:r>
+            <a:r>
+              <a:rPr lang="en-US" sz="900" dirty="0">
+                <a:latin typeface="Courier New" panose="02070309020205020404" pitchFamily="49" charset="0"/>
+                <a:cs typeface="Courier New" panose="02070309020205020404" pitchFamily="49" charset="0"/>
+              </a:rPr>
+              <a:t> network-topology                           //network topology (single-node, multi-node</a:t>
+            </a:r>
+          </a:p>
+          <a:p>
+            <a:r>
+              <a:rPr lang="en-US" sz="900" dirty="0">
+                <a:latin typeface="Courier New" panose="02070309020205020404" pitchFamily="49" charset="0"/>
+                <a:cs typeface="Courier New" panose="02070309020205020404" pitchFamily="49" charset="0"/>
+              </a:rPr>
+              <a:t>         |  +--</a:t>
+            </a:r>
+            <a:r>
+              <a:rPr lang="en-US" sz="900" dirty="0" err="1">
+                <a:latin typeface="Courier New" panose="02070309020205020404" pitchFamily="49" charset="0"/>
+                <a:cs typeface="Courier New" panose="02070309020205020404" pitchFamily="49" charset="0"/>
+              </a:rPr>
+              <a:t>rw</a:t>
+            </a:r>
+            <a:r>
+              <a:rPr lang="en-US" sz="900" dirty="0">
+                <a:latin typeface="Courier New" panose="02070309020205020404" pitchFamily="49" charset="0"/>
+                <a:cs typeface="Courier New" panose="02070309020205020404" pitchFamily="49" charset="0"/>
+              </a:rPr>
+              <a:t> topology* [topology-id]                 // schema-mount of draft-</a:t>
+            </a:r>
+            <a:r>
+              <a:rPr lang="en-US" sz="900" dirty="0" err="1">
+                <a:latin typeface="Courier New" panose="02070309020205020404" pitchFamily="49" charset="0"/>
+                <a:cs typeface="Courier New" panose="02070309020205020404" pitchFamily="49" charset="0"/>
+              </a:rPr>
+              <a:t>liu</a:t>
+            </a:r>
+            <a:r>
+              <a:rPr lang="en-US" sz="900" dirty="0">
+                <a:latin typeface="Courier New" panose="02070309020205020404" pitchFamily="49" charset="0"/>
+                <a:cs typeface="Courier New" panose="02070309020205020404" pitchFamily="49" charset="0"/>
+              </a:rPr>
+              <a:t>?</a:t>
+            </a:r>
+          </a:p>
+          <a:p>
+            <a:r>
+              <a:rPr lang="en-US" sz="900" dirty="0">
+                <a:latin typeface="Courier New" panose="02070309020205020404" pitchFamily="49" charset="0"/>
+                <a:cs typeface="Courier New" panose="02070309020205020404" pitchFamily="49" charset="0"/>
+              </a:rPr>
+              <a:t>         |     +--</a:t>
+            </a:r>
+            <a:r>
+              <a:rPr lang="en-US" sz="900" dirty="0" err="1">
+                <a:latin typeface="Courier New" panose="02070309020205020404" pitchFamily="49" charset="0"/>
+                <a:cs typeface="Courier New" panose="02070309020205020404" pitchFamily="49" charset="0"/>
+              </a:rPr>
+              <a:t>rw</a:t>
+            </a:r>
+            <a:r>
+              <a:rPr lang="en-US" sz="900" dirty="0">
+                <a:latin typeface="Courier New" panose="02070309020205020404" pitchFamily="49" charset="0"/>
+                <a:cs typeface="Courier New" panose="02070309020205020404" pitchFamily="49" charset="0"/>
+              </a:rPr>
+              <a:t> topology-id</a:t>
+            </a:r>
+          </a:p>
+          <a:p>
+            <a:r>
+              <a:rPr lang="en-US" sz="900" dirty="0">
+                <a:latin typeface="Courier New" panose="02070309020205020404" pitchFamily="49" charset="0"/>
+                <a:cs typeface="Courier New" panose="02070309020205020404" pitchFamily="49" charset="0"/>
+              </a:rPr>
+              <a:t>         |     +--</a:t>
+            </a:r>
+            <a:r>
+              <a:rPr lang="en-US" sz="900" dirty="0" err="1">
+                <a:latin typeface="Courier New" panose="02070309020205020404" pitchFamily="49" charset="0"/>
+                <a:cs typeface="Courier New" panose="02070309020205020404" pitchFamily="49" charset="0"/>
+              </a:rPr>
+              <a:t>rw</a:t>
+            </a:r>
+            <a:r>
+              <a:rPr lang="en-US" sz="900" dirty="0">
+                <a:latin typeface="Courier New" panose="02070309020205020404" pitchFamily="49" charset="0"/>
+                <a:cs typeface="Courier New" panose="02070309020205020404" pitchFamily="49" charset="0"/>
+              </a:rPr>
+              <a:t> node [node-id]</a:t>
+            </a:r>
+          </a:p>
+          <a:p>
+            <a:r>
+              <a:rPr lang="en-US" sz="900" dirty="0">
+                <a:latin typeface="Courier New" panose="02070309020205020404" pitchFamily="49" charset="0"/>
+                <a:cs typeface="Courier New" panose="02070309020205020404" pitchFamily="49" charset="0"/>
+              </a:rPr>
+              <a:t>         |     |  +--</a:t>
+            </a:r>
+            <a:r>
+              <a:rPr lang="en-US" sz="900" dirty="0" err="1">
+                <a:latin typeface="Courier New" panose="02070309020205020404" pitchFamily="49" charset="0"/>
+                <a:cs typeface="Courier New" panose="02070309020205020404" pitchFamily="49" charset="0"/>
+              </a:rPr>
+              <a:t>rw</a:t>
+            </a:r>
+            <a:r>
+              <a:rPr lang="en-US" sz="900" dirty="0">
+                <a:latin typeface="Courier New" panose="02070309020205020404" pitchFamily="49" charset="0"/>
+                <a:cs typeface="Courier New" panose="02070309020205020404" pitchFamily="49" charset="0"/>
+              </a:rPr>
+              <a:t> </a:t>
+            </a:r>
+            <a:r>
+              <a:rPr lang="en-US" sz="900" dirty="0" err="1">
+                <a:latin typeface="Courier New" panose="02070309020205020404" pitchFamily="49" charset="0"/>
+                <a:cs typeface="Courier New" panose="02070309020205020404" pitchFamily="49" charset="0"/>
+              </a:rPr>
+              <a:t>slo</a:t>
+            </a:r>
+            <a:endParaRPr lang="en-US" sz="900" dirty="0">
+              <a:latin typeface="Courier New" panose="02070309020205020404" pitchFamily="49" charset="0"/>
+              <a:cs typeface="Courier New" panose="02070309020205020404" pitchFamily="49" charset="0"/>
+            </a:endParaRPr>
+          </a:p>
+          <a:p>
+            <a:r>
+              <a:rPr lang="en-US" sz="900" dirty="0">
+                <a:latin typeface="Courier New" panose="02070309020205020404" pitchFamily="49" charset="0"/>
+                <a:cs typeface="Courier New" panose="02070309020205020404" pitchFamily="49" charset="0"/>
+              </a:rPr>
+              <a:t>         |     +--</a:t>
+            </a:r>
+            <a:r>
+              <a:rPr lang="en-US" sz="900" dirty="0" err="1">
+                <a:latin typeface="Courier New" panose="02070309020205020404" pitchFamily="49" charset="0"/>
+                <a:cs typeface="Courier New" panose="02070309020205020404" pitchFamily="49" charset="0"/>
+              </a:rPr>
+              <a:t>rw</a:t>
+            </a:r>
+            <a:r>
+              <a:rPr lang="en-US" sz="900" dirty="0">
+                <a:latin typeface="Courier New" panose="02070309020205020404" pitchFamily="49" charset="0"/>
+                <a:cs typeface="Courier New" panose="02070309020205020404" pitchFamily="49" charset="0"/>
+              </a:rPr>
+              <a:t> link [link-id]</a:t>
+            </a:r>
+          </a:p>
+          <a:p>
+            <a:r>
+              <a:rPr lang="en-US" sz="900" dirty="0">
+                <a:latin typeface="Courier New" panose="02070309020205020404" pitchFamily="49" charset="0"/>
+                <a:cs typeface="Courier New" panose="02070309020205020404" pitchFamily="49" charset="0"/>
+              </a:rPr>
+              <a:t>         |     |  +--</a:t>
+            </a:r>
+            <a:r>
+              <a:rPr lang="en-US" sz="900" dirty="0" err="1">
+                <a:latin typeface="Courier New" panose="02070309020205020404" pitchFamily="49" charset="0"/>
+                <a:cs typeface="Courier New" panose="02070309020205020404" pitchFamily="49" charset="0"/>
+              </a:rPr>
+              <a:t>rw</a:t>
+            </a:r>
+            <a:r>
+              <a:rPr lang="en-US" sz="900" dirty="0">
+                <a:latin typeface="Courier New" panose="02070309020205020404" pitchFamily="49" charset="0"/>
+                <a:cs typeface="Courier New" panose="02070309020205020404" pitchFamily="49" charset="0"/>
+              </a:rPr>
+              <a:t> </a:t>
+            </a:r>
+            <a:r>
+              <a:rPr lang="en-US" sz="900" dirty="0" err="1">
+                <a:latin typeface="Courier New" panose="02070309020205020404" pitchFamily="49" charset="0"/>
+                <a:cs typeface="Courier New" panose="02070309020205020404" pitchFamily="49" charset="0"/>
+              </a:rPr>
+              <a:t>slo</a:t>
+            </a:r>
+            <a:endParaRPr lang="en-US" sz="900" dirty="0">
+              <a:latin typeface="Courier New" panose="02070309020205020404" pitchFamily="49" charset="0"/>
+              <a:cs typeface="Courier New" panose="02070309020205020404" pitchFamily="49" charset="0"/>
+            </a:endParaRPr>
+          </a:p>
+          <a:p>
+            <a:r>
+              <a:rPr lang="en-US" sz="900" dirty="0">
+                <a:latin typeface="Courier New" panose="02070309020205020404" pitchFamily="49" charset="0"/>
+                <a:cs typeface="Courier New" panose="02070309020205020404" pitchFamily="49" charset="0"/>
+              </a:rPr>
+              <a:t>         |     +--</a:t>
+            </a:r>
+            <a:r>
+              <a:rPr lang="en-US" sz="900" dirty="0" err="1">
+                <a:latin typeface="Courier New" panose="02070309020205020404" pitchFamily="49" charset="0"/>
+                <a:cs typeface="Courier New" panose="02070309020205020404" pitchFamily="49" charset="0"/>
+              </a:rPr>
+              <a:t>rw</a:t>
+            </a:r>
+            <a:r>
+              <a:rPr lang="en-US" sz="900" dirty="0">
+                <a:latin typeface="Courier New" panose="02070309020205020404" pitchFamily="49" charset="0"/>
+                <a:cs typeface="Courier New" panose="02070309020205020404" pitchFamily="49" charset="0"/>
+              </a:rPr>
+              <a:t> </a:t>
+            </a:r>
+            <a:r>
+              <a:rPr lang="en-US" sz="900" dirty="0" err="1">
+                <a:latin typeface="Courier New" panose="02070309020205020404" pitchFamily="49" charset="0"/>
+                <a:cs typeface="Courier New" panose="02070309020205020404" pitchFamily="49" charset="0"/>
+              </a:rPr>
+              <a:t>tp</a:t>
+            </a:r>
+            <a:r>
+              <a:rPr lang="en-US" sz="900" dirty="0">
+                <a:latin typeface="Courier New" panose="02070309020205020404" pitchFamily="49" charset="0"/>
+                <a:cs typeface="Courier New" panose="02070309020205020404" pitchFamily="49" charset="0"/>
+              </a:rPr>
+              <a:t> [</a:t>
+            </a:r>
+            <a:r>
+              <a:rPr lang="en-US" sz="900" dirty="0" err="1">
+                <a:latin typeface="Courier New" panose="02070309020205020404" pitchFamily="49" charset="0"/>
+                <a:cs typeface="Courier New" panose="02070309020205020404" pitchFamily="49" charset="0"/>
+              </a:rPr>
+              <a:t>tp</a:t>
+            </a:r>
+            <a:r>
+              <a:rPr lang="en-US" sz="900" dirty="0">
+                <a:latin typeface="Courier New" panose="02070309020205020404" pitchFamily="49" charset="0"/>
+                <a:cs typeface="Courier New" panose="02070309020205020404" pitchFamily="49" charset="0"/>
+              </a:rPr>
+              <a:t>-id]</a:t>
+            </a:r>
+          </a:p>
+          <a:p>
+            <a:r>
+              <a:rPr lang="en-US" sz="900" dirty="0">
+                <a:latin typeface="Courier New" panose="02070309020205020404" pitchFamily="49" charset="0"/>
+                <a:cs typeface="Courier New" panose="02070309020205020404" pitchFamily="49" charset="0"/>
+              </a:rPr>
+              <a:t>         |        +--</a:t>
+            </a:r>
+            <a:r>
+              <a:rPr lang="en-US" sz="900" dirty="0" err="1">
+                <a:latin typeface="Courier New" panose="02070309020205020404" pitchFamily="49" charset="0"/>
+                <a:cs typeface="Courier New" panose="02070309020205020404" pitchFamily="49" charset="0"/>
+              </a:rPr>
+              <a:t>rw</a:t>
+            </a:r>
+            <a:r>
+              <a:rPr lang="en-US" sz="900" dirty="0">
+                <a:latin typeface="Courier New" panose="02070309020205020404" pitchFamily="49" charset="0"/>
+                <a:cs typeface="Courier New" panose="02070309020205020404" pitchFamily="49" charset="0"/>
+              </a:rPr>
+              <a:t> </a:t>
+            </a:r>
+            <a:r>
+              <a:rPr lang="en-US" sz="900" dirty="0" err="1">
+                <a:latin typeface="Courier New" panose="02070309020205020404" pitchFamily="49" charset="0"/>
+                <a:cs typeface="Courier New" panose="02070309020205020404" pitchFamily="49" charset="0"/>
+              </a:rPr>
+              <a:t>slo</a:t>
+            </a:r>
+            <a:endParaRPr lang="en-US" sz="900" dirty="0">
+              <a:latin typeface="Courier New" panose="02070309020205020404" pitchFamily="49" charset="0"/>
+              <a:cs typeface="Courier New" panose="02070309020205020404" pitchFamily="49" charset="0"/>
+            </a:endParaRPr>
+          </a:p>
+          <a:p>
+            <a:r>
+              <a:rPr lang="en-US" sz="900" dirty="0">
+                <a:latin typeface="Courier New" panose="02070309020205020404" pitchFamily="49" charset="0"/>
+                <a:cs typeface="Courier New" panose="02070309020205020404" pitchFamily="49" charset="0"/>
+              </a:rPr>
+              <a:t>         |        +--</a:t>
+            </a:r>
+            <a:r>
+              <a:rPr lang="en-US" sz="900" dirty="0" err="1">
+                <a:latin typeface="Courier New" panose="02070309020205020404" pitchFamily="49" charset="0"/>
+                <a:cs typeface="Courier New" panose="02070309020205020404" pitchFamily="49" charset="0"/>
+              </a:rPr>
+              <a:t>rw</a:t>
+            </a:r>
+            <a:r>
+              <a:rPr lang="en-US" sz="900" dirty="0">
+                <a:latin typeface="Courier New" panose="02070309020205020404" pitchFamily="49" charset="0"/>
+                <a:cs typeface="Courier New" panose="02070309020205020404" pitchFamily="49" charset="0"/>
+              </a:rPr>
+              <a:t> is-endpoint?   Boolean</a:t>
+            </a:r>
+          </a:p>
+          <a:p>
+            <a:r>
+              <a:rPr lang="en-US" sz="900" dirty="0">
+                <a:latin typeface="Courier New" panose="02070309020205020404" pitchFamily="49" charset="0"/>
+                <a:cs typeface="Courier New" panose="02070309020205020404" pitchFamily="49" charset="0"/>
+              </a:rPr>
+              <a:t>         |        +--</a:t>
+            </a:r>
+            <a:r>
+              <a:rPr lang="en-US" sz="900" dirty="0" err="1">
+                <a:latin typeface="Courier New" panose="02070309020205020404" pitchFamily="49" charset="0"/>
+                <a:cs typeface="Courier New" panose="02070309020205020404" pitchFamily="49" charset="0"/>
+              </a:rPr>
+              <a:t>rw</a:t>
+            </a:r>
+            <a:r>
+              <a:rPr lang="en-US" sz="900" dirty="0">
+                <a:latin typeface="Courier New" panose="02070309020205020404" pitchFamily="49" charset="0"/>
+                <a:cs typeface="Courier New" panose="02070309020205020404" pitchFamily="49" charset="0"/>
+              </a:rPr>
+              <a:t> ap-id?         -&gt;/access-point/ap/ap-id  </a:t>
+            </a:r>
+          </a:p>
+          <a:p>
+            <a:r>
+              <a:rPr lang="en-US" sz="900" dirty="0">
+                <a:latin typeface="Courier New" panose="02070309020205020404" pitchFamily="49" charset="0"/>
+                <a:cs typeface="Courier New" panose="02070309020205020404" pitchFamily="49" charset="0"/>
+              </a:rPr>
+              <a:t>         +--</a:t>
+            </a:r>
+            <a:r>
+              <a:rPr lang="en-US" sz="900" dirty="0" err="1">
+                <a:latin typeface="Courier New" panose="02070309020205020404" pitchFamily="49" charset="0"/>
+                <a:cs typeface="Courier New" panose="02070309020205020404" pitchFamily="49" charset="0"/>
+              </a:rPr>
+              <a:t>rw</a:t>
+            </a:r>
+            <a:r>
+              <a:rPr lang="en-US" sz="900" dirty="0">
+                <a:latin typeface="Courier New" panose="02070309020205020404" pitchFamily="49" charset="0"/>
+                <a:cs typeface="Courier New" panose="02070309020205020404" pitchFamily="49" charset="0"/>
+              </a:rPr>
+              <a:t> connectivity-matrices</a:t>
+            </a:r>
+          </a:p>
+          <a:p>
+            <a:pPr lvl="1"/>
+            <a:r>
+              <a:rPr lang="en-US" sz="900" dirty="0">
+                <a:latin typeface="Courier New" panose="02070309020205020404" pitchFamily="49" charset="0"/>
+                <a:cs typeface="Courier New" panose="02070309020205020404" pitchFamily="49" charset="0"/>
+              </a:rPr>
+              <a:t>     +--</a:t>
+            </a:r>
+            <a:r>
+              <a:rPr lang="en-US" sz="900" dirty="0" err="1">
+                <a:latin typeface="Courier New" panose="02070309020205020404" pitchFamily="49" charset="0"/>
+                <a:cs typeface="Courier New" panose="02070309020205020404" pitchFamily="49" charset="0"/>
+              </a:rPr>
+              <a:t>rw</a:t>
+            </a:r>
+            <a:r>
+              <a:rPr lang="en-US" sz="900" dirty="0">
+                <a:latin typeface="Courier New" panose="02070309020205020404" pitchFamily="49" charset="0"/>
+                <a:cs typeface="Courier New" panose="02070309020205020404" pitchFamily="49" charset="0"/>
+              </a:rPr>
+              <a:t> connectivity-matrix* [connectivity-matrix-id]</a:t>
+            </a:r>
+          </a:p>
+          <a:p>
+            <a:pPr lvl="1"/>
+            <a:r>
+              <a:rPr lang="en-US" sz="900" dirty="0">
+                <a:latin typeface="Courier New" panose="02070309020205020404" pitchFamily="49" charset="0"/>
+                <a:cs typeface="Courier New" panose="02070309020205020404" pitchFamily="49" charset="0"/>
+              </a:rPr>
+              <a:t>        +--</a:t>
+            </a:r>
+            <a:r>
+              <a:rPr lang="en-US" sz="900" dirty="0" err="1">
+                <a:latin typeface="Courier New" panose="02070309020205020404" pitchFamily="49" charset="0"/>
+                <a:cs typeface="Courier New" panose="02070309020205020404" pitchFamily="49" charset="0"/>
+              </a:rPr>
+              <a:t>rw</a:t>
+            </a:r>
+            <a:r>
+              <a:rPr lang="en-US" sz="900" dirty="0">
+                <a:latin typeface="Courier New" panose="02070309020205020404" pitchFamily="49" charset="0"/>
+                <a:cs typeface="Courier New" panose="02070309020205020404" pitchFamily="49" charset="0"/>
+              </a:rPr>
+              <a:t> connectivity-matrix-id     uint32</a:t>
+            </a:r>
+          </a:p>
+          <a:p>
+            <a:pPr lvl="1"/>
+            <a:r>
+              <a:rPr lang="en-US" sz="900" dirty="0">
+                <a:latin typeface="Courier New" panose="02070309020205020404" pitchFamily="49" charset="0"/>
+                <a:cs typeface="Courier New" panose="02070309020205020404" pitchFamily="49" charset="0"/>
+              </a:rPr>
+              <a:t>        +--</a:t>
+            </a:r>
+            <a:r>
+              <a:rPr lang="en-US" sz="900" dirty="0" err="1">
+                <a:latin typeface="Courier New" panose="02070309020205020404" pitchFamily="49" charset="0"/>
+                <a:cs typeface="Courier New" panose="02070309020205020404" pitchFamily="49" charset="0"/>
+              </a:rPr>
+              <a:t>rw</a:t>
+            </a:r>
+            <a:r>
+              <a:rPr lang="en-US" sz="900" dirty="0">
+                <a:latin typeface="Courier New" panose="02070309020205020404" pitchFamily="49" charset="0"/>
+                <a:cs typeface="Courier New" panose="02070309020205020404" pitchFamily="49" charset="0"/>
+              </a:rPr>
+              <a:t> network-topology-id        -&gt;/network-slice/network-topology/topology/topology-id</a:t>
+            </a:r>
+          </a:p>
+          <a:p>
+            <a:pPr lvl="1"/>
+            <a:r>
+              <a:rPr lang="en-US" sz="900" dirty="0">
+                <a:latin typeface="Courier New" panose="02070309020205020404" pitchFamily="49" charset="0"/>
+                <a:cs typeface="Courier New" panose="02070309020205020404" pitchFamily="49" charset="0"/>
+              </a:rPr>
+              <a:t>        +--</a:t>
+            </a:r>
+            <a:r>
+              <a:rPr lang="en-US" sz="900" dirty="0" err="1">
+                <a:latin typeface="Courier New" panose="02070309020205020404" pitchFamily="49" charset="0"/>
+                <a:cs typeface="Courier New" panose="02070309020205020404" pitchFamily="49" charset="0"/>
+              </a:rPr>
+              <a:t>rw</a:t>
+            </a:r>
+            <a:r>
+              <a:rPr lang="en-US" sz="900" dirty="0">
+                <a:latin typeface="Courier New" panose="02070309020205020404" pitchFamily="49" charset="0"/>
+                <a:cs typeface="Courier New" panose="02070309020205020404" pitchFamily="49" charset="0"/>
+              </a:rPr>
+              <a:t> </a:t>
+            </a:r>
+            <a:r>
+              <a:rPr lang="en-US" sz="900" dirty="0" err="1">
+                <a:latin typeface="Courier New" panose="02070309020205020404" pitchFamily="49" charset="0"/>
+                <a:cs typeface="Courier New" panose="02070309020205020404" pitchFamily="49" charset="0"/>
+              </a:rPr>
+              <a:t>src</a:t>
+            </a:r>
+            <a:r>
+              <a:rPr lang="en-US" sz="900" dirty="0">
+                <a:latin typeface="Courier New" panose="02070309020205020404" pitchFamily="49" charset="0"/>
+                <a:cs typeface="Courier New" panose="02070309020205020404" pitchFamily="49" charset="0"/>
+              </a:rPr>
+              <a:t>-endpoint               -&gt;/network-slice/network-topology/topology/</a:t>
+            </a:r>
+            <a:r>
+              <a:rPr lang="en-US" sz="900" dirty="0" err="1">
+                <a:latin typeface="Courier New" panose="02070309020205020404" pitchFamily="49" charset="0"/>
+                <a:cs typeface="Courier New" panose="02070309020205020404" pitchFamily="49" charset="0"/>
+              </a:rPr>
+              <a:t>tp</a:t>
+            </a:r>
+            <a:r>
+              <a:rPr lang="en-US" sz="900" dirty="0">
+                <a:latin typeface="Courier New" panose="02070309020205020404" pitchFamily="49" charset="0"/>
+                <a:cs typeface="Courier New" panose="02070309020205020404" pitchFamily="49" charset="0"/>
+              </a:rPr>
+              <a:t>/</a:t>
+            </a:r>
+            <a:r>
+              <a:rPr lang="en-US" sz="900" dirty="0" err="1">
+                <a:latin typeface="Courier New" panose="02070309020205020404" pitchFamily="49" charset="0"/>
+                <a:cs typeface="Courier New" panose="02070309020205020404" pitchFamily="49" charset="0"/>
+              </a:rPr>
+              <a:t>tp</a:t>
+            </a:r>
+            <a:r>
+              <a:rPr lang="en-US" sz="900" dirty="0">
+                <a:latin typeface="Courier New" panose="02070309020205020404" pitchFamily="49" charset="0"/>
+                <a:cs typeface="Courier New" panose="02070309020205020404" pitchFamily="49" charset="0"/>
+              </a:rPr>
+              <a:t>-id</a:t>
+            </a:r>
+          </a:p>
+          <a:p>
+            <a:pPr lvl="1"/>
+            <a:r>
+              <a:rPr lang="en-US" sz="900" dirty="0">
+                <a:latin typeface="Courier New" panose="02070309020205020404" pitchFamily="49" charset="0"/>
+                <a:cs typeface="Courier New" panose="02070309020205020404" pitchFamily="49" charset="0"/>
+              </a:rPr>
+              <a:t>        +--</a:t>
+            </a:r>
+            <a:r>
+              <a:rPr lang="en-US" sz="900" dirty="0" err="1">
+                <a:latin typeface="Courier New" panose="02070309020205020404" pitchFamily="49" charset="0"/>
+                <a:cs typeface="Courier New" panose="02070309020205020404" pitchFamily="49" charset="0"/>
+              </a:rPr>
+              <a:t>rw</a:t>
+            </a:r>
+            <a:r>
+              <a:rPr lang="en-US" sz="900" dirty="0">
+                <a:latin typeface="Courier New" panose="02070309020205020404" pitchFamily="49" charset="0"/>
+                <a:cs typeface="Courier New" panose="02070309020205020404" pitchFamily="49" charset="0"/>
+              </a:rPr>
+              <a:t> </a:t>
+            </a:r>
+            <a:r>
+              <a:rPr lang="en-US" sz="900" dirty="0" err="1">
+                <a:latin typeface="Courier New" panose="02070309020205020404" pitchFamily="49" charset="0"/>
+                <a:cs typeface="Courier New" panose="02070309020205020404" pitchFamily="49" charset="0"/>
+              </a:rPr>
+              <a:t>dst</a:t>
+            </a:r>
+            <a:r>
+              <a:rPr lang="en-US" sz="900" dirty="0">
+                <a:latin typeface="Courier New" panose="02070309020205020404" pitchFamily="49" charset="0"/>
+                <a:cs typeface="Courier New" panose="02070309020205020404" pitchFamily="49" charset="0"/>
+              </a:rPr>
+              <a:t>-endpoint               -&gt;/network-slice/network-topology/topology/</a:t>
+            </a:r>
+            <a:r>
+              <a:rPr lang="en-US" sz="900" dirty="0" err="1">
+                <a:latin typeface="Courier New" panose="02070309020205020404" pitchFamily="49" charset="0"/>
+                <a:cs typeface="Courier New" panose="02070309020205020404" pitchFamily="49" charset="0"/>
+              </a:rPr>
+              <a:t>tp</a:t>
+            </a:r>
+            <a:r>
+              <a:rPr lang="en-US" sz="900" dirty="0">
+                <a:latin typeface="Courier New" panose="02070309020205020404" pitchFamily="49" charset="0"/>
+                <a:cs typeface="Courier New" panose="02070309020205020404" pitchFamily="49" charset="0"/>
+              </a:rPr>
+              <a:t>/</a:t>
+            </a:r>
+            <a:r>
+              <a:rPr lang="en-US" sz="900" dirty="0" err="1">
+                <a:latin typeface="Courier New" panose="02070309020205020404" pitchFamily="49" charset="0"/>
+                <a:cs typeface="Courier New" panose="02070309020205020404" pitchFamily="49" charset="0"/>
+              </a:rPr>
+              <a:t>tp</a:t>
+            </a:r>
+            <a:r>
+              <a:rPr lang="en-US" sz="900" dirty="0">
+                <a:latin typeface="Courier New" panose="02070309020205020404" pitchFamily="49" charset="0"/>
+                <a:cs typeface="Courier New" panose="02070309020205020404" pitchFamily="49" charset="0"/>
+              </a:rPr>
+              <a:t>-id</a:t>
+            </a:r>
+          </a:p>
+          <a:p>
+            <a:pPr lvl="1"/>
+            <a:r>
+              <a:rPr lang="en-US" sz="900" dirty="0">
+                <a:latin typeface="Courier New" panose="02070309020205020404" pitchFamily="49" charset="0"/>
+                <a:cs typeface="Courier New" panose="02070309020205020404" pitchFamily="49" charset="0"/>
+              </a:rPr>
+              <a:t>        +--</a:t>
+            </a:r>
+            <a:r>
+              <a:rPr lang="en-US" sz="900" dirty="0" err="1">
+                <a:latin typeface="Courier New" panose="02070309020205020404" pitchFamily="49" charset="0"/>
+                <a:cs typeface="Courier New" panose="02070309020205020404" pitchFamily="49" charset="0"/>
+              </a:rPr>
+              <a:t>rw</a:t>
+            </a:r>
+            <a:r>
+              <a:rPr lang="en-US" sz="900" dirty="0">
+                <a:latin typeface="Courier New" panose="02070309020205020404" pitchFamily="49" charset="0"/>
+                <a:cs typeface="Courier New" panose="02070309020205020404" pitchFamily="49" charset="0"/>
+              </a:rPr>
+              <a:t> underlay-path[index]</a:t>
+            </a:r>
+          </a:p>
+          <a:p>
+            <a:pPr lvl="1"/>
+            <a:r>
+              <a:rPr lang="en-US" sz="900" dirty="0">
+                <a:latin typeface="Courier New" panose="02070309020205020404" pitchFamily="49" charset="0"/>
+                <a:cs typeface="Courier New" panose="02070309020205020404" pitchFamily="49" charset="0"/>
+              </a:rPr>
+              <a:t>        |  +--</a:t>
+            </a:r>
+            <a:r>
+              <a:rPr lang="en-US" sz="900" dirty="0" err="1">
+                <a:latin typeface="Courier New" panose="02070309020205020404" pitchFamily="49" charset="0"/>
+                <a:cs typeface="Courier New" panose="02070309020205020404" pitchFamily="49" charset="0"/>
+              </a:rPr>
+              <a:t>rw</a:t>
+            </a:r>
+            <a:r>
+              <a:rPr lang="en-US" sz="900" dirty="0">
+                <a:latin typeface="Courier New" panose="02070309020205020404" pitchFamily="49" charset="0"/>
+                <a:cs typeface="Courier New" panose="02070309020205020404" pitchFamily="49" charset="0"/>
+              </a:rPr>
+              <a:t> index	        uint16</a:t>
+            </a:r>
+          </a:p>
+          <a:p>
+            <a:pPr lvl="1"/>
+            <a:r>
+              <a:rPr lang="en-US" sz="900" dirty="0">
+                <a:latin typeface="Courier New" panose="02070309020205020404" pitchFamily="49" charset="0"/>
+                <a:cs typeface="Courier New" panose="02070309020205020404" pitchFamily="49" charset="0"/>
+              </a:rPr>
+              <a:t>        |  +--</a:t>
+            </a:r>
+            <a:r>
+              <a:rPr lang="en-US" sz="900" dirty="0" err="1">
+                <a:latin typeface="Courier New" panose="02070309020205020404" pitchFamily="49" charset="0"/>
+                <a:cs typeface="Courier New" panose="02070309020205020404" pitchFamily="49" charset="0"/>
+              </a:rPr>
+              <a:t>rw</a:t>
+            </a:r>
+            <a:r>
+              <a:rPr lang="en-US" sz="900" dirty="0">
+                <a:latin typeface="Courier New" panose="02070309020205020404" pitchFamily="49" charset="0"/>
+                <a:cs typeface="Courier New" panose="02070309020205020404" pitchFamily="49" charset="0"/>
+              </a:rPr>
+              <a:t> node-id       -&gt;/network-slice/network-topology/topology/node/node-id</a:t>
+            </a:r>
+          </a:p>
+          <a:p>
+            <a:pPr lvl="1"/>
+            <a:r>
+              <a:rPr lang="en-US" sz="900" dirty="0">
+                <a:latin typeface="Courier New" panose="02070309020205020404" pitchFamily="49" charset="0"/>
+                <a:cs typeface="Courier New" panose="02070309020205020404" pitchFamily="49" charset="0"/>
+              </a:rPr>
+              <a:t>        |  +--</a:t>
+            </a:r>
+            <a:r>
+              <a:rPr lang="en-US" sz="900" dirty="0" err="1">
+                <a:latin typeface="Courier New" panose="02070309020205020404" pitchFamily="49" charset="0"/>
+                <a:cs typeface="Courier New" panose="02070309020205020404" pitchFamily="49" charset="0"/>
+              </a:rPr>
+              <a:t>rw</a:t>
+            </a:r>
+            <a:r>
+              <a:rPr lang="en-US" sz="900" dirty="0">
+                <a:latin typeface="Courier New" panose="02070309020205020404" pitchFamily="49" charset="0"/>
+                <a:cs typeface="Courier New" panose="02070309020205020404" pitchFamily="49" charset="0"/>
+              </a:rPr>
+              <a:t> </a:t>
+            </a:r>
+            <a:r>
+              <a:rPr lang="en-US" sz="900" dirty="0" err="1">
+                <a:latin typeface="Courier New" panose="02070309020205020404" pitchFamily="49" charset="0"/>
+                <a:cs typeface="Courier New" panose="02070309020205020404" pitchFamily="49" charset="0"/>
+              </a:rPr>
+              <a:t>tp</a:t>
+            </a:r>
+            <a:r>
+              <a:rPr lang="en-US" sz="900" dirty="0">
+                <a:latin typeface="Courier New" panose="02070309020205020404" pitchFamily="49" charset="0"/>
+                <a:cs typeface="Courier New" panose="02070309020205020404" pitchFamily="49" charset="0"/>
+              </a:rPr>
+              <a:t>-id         -&gt;/network-slice/network-topology/topology/</a:t>
+            </a:r>
+            <a:r>
+              <a:rPr lang="en-US" sz="900" dirty="0" err="1">
+                <a:latin typeface="Courier New" panose="02070309020205020404" pitchFamily="49" charset="0"/>
+                <a:cs typeface="Courier New" panose="02070309020205020404" pitchFamily="49" charset="0"/>
+              </a:rPr>
+              <a:t>tp</a:t>
+            </a:r>
+            <a:r>
+              <a:rPr lang="en-US" sz="900" dirty="0">
+                <a:latin typeface="Courier New" panose="02070309020205020404" pitchFamily="49" charset="0"/>
+                <a:cs typeface="Courier New" panose="02070309020205020404" pitchFamily="49" charset="0"/>
+              </a:rPr>
+              <a:t>/</a:t>
+            </a:r>
+            <a:r>
+              <a:rPr lang="en-US" sz="900" dirty="0" err="1">
+                <a:latin typeface="Courier New" panose="02070309020205020404" pitchFamily="49" charset="0"/>
+                <a:cs typeface="Courier New" panose="02070309020205020404" pitchFamily="49" charset="0"/>
+              </a:rPr>
+              <a:t>tp</a:t>
+            </a:r>
+            <a:r>
+              <a:rPr lang="en-US" sz="900" dirty="0">
+                <a:latin typeface="Courier New" panose="02070309020205020404" pitchFamily="49" charset="0"/>
+                <a:cs typeface="Courier New" panose="02070309020205020404" pitchFamily="49" charset="0"/>
+              </a:rPr>
+              <a:t>-id</a:t>
+            </a:r>
+          </a:p>
+          <a:p>
+            <a:pPr lvl="1"/>
+            <a:r>
+              <a:rPr lang="en-US" sz="900" dirty="0">
+                <a:latin typeface="Courier New" panose="02070309020205020404" pitchFamily="49" charset="0"/>
+                <a:cs typeface="Courier New" panose="02070309020205020404" pitchFamily="49" charset="0"/>
+              </a:rPr>
+              <a:t>        |  +--</a:t>
+            </a:r>
+            <a:r>
+              <a:rPr lang="en-US" sz="900" dirty="0" err="1">
+                <a:latin typeface="Courier New" panose="02070309020205020404" pitchFamily="49" charset="0"/>
+                <a:cs typeface="Courier New" panose="02070309020205020404" pitchFamily="49" charset="0"/>
+              </a:rPr>
+              <a:t>rw</a:t>
+            </a:r>
+            <a:r>
+              <a:rPr lang="en-US" sz="900" dirty="0">
+                <a:latin typeface="Courier New" panose="02070309020205020404" pitchFamily="49" charset="0"/>
+                <a:cs typeface="Courier New" panose="02070309020205020404" pitchFamily="49" charset="0"/>
+              </a:rPr>
+              <a:t> </a:t>
+            </a:r>
+            <a:r>
+              <a:rPr lang="en-US" sz="900" dirty="0" err="1">
+                <a:latin typeface="Courier New" panose="02070309020205020404" pitchFamily="49" charset="0"/>
+                <a:cs typeface="Courier New" panose="02070309020205020404" pitchFamily="49" charset="0"/>
+              </a:rPr>
+              <a:t>slo</a:t>
+            </a:r>
+            <a:endParaRPr lang="en-US" sz="900" dirty="0">
+              <a:latin typeface="Courier New" panose="02070309020205020404" pitchFamily="49" charset="0"/>
+              <a:cs typeface="Courier New" panose="02070309020205020404" pitchFamily="49" charset="0"/>
+            </a:endParaRPr>
+          </a:p>
+          <a:p>
+            <a:pPr lvl="1"/>
+            <a:r>
+              <a:rPr lang="en-US" sz="900" dirty="0">
+                <a:latin typeface="Courier New" panose="02070309020205020404" pitchFamily="49" charset="0"/>
+                <a:cs typeface="Courier New" panose="02070309020205020404" pitchFamily="49" charset="0"/>
+              </a:rPr>
+              <a:t>        +--</a:t>
+            </a:r>
+            <a:r>
+              <a:rPr lang="en-US" sz="900" dirty="0" err="1">
+                <a:latin typeface="Courier New" panose="02070309020205020404" pitchFamily="49" charset="0"/>
+                <a:cs typeface="Courier New" panose="02070309020205020404" pitchFamily="49" charset="0"/>
+              </a:rPr>
+              <a:t>rw</a:t>
+            </a:r>
+            <a:r>
+              <a:rPr lang="en-US" sz="900" dirty="0">
+                <a:latin typeface="Courier New" panose="02070309020205020404" pitchFamily="49" charset="0"/>
+                <a:cs typeface="Courier New" panose="02070309020205020404" pitchFamily="49" charset="0"/>
+              </a:rPr>
+              <a:t> </a:t>
+            </a:r>
+            <a:r>
+              <a:rPr lang="en-US" sz="900" dirty="0" err="1">
+                <a:latin typeface="Courier New" panose="02070309020205020404" pitchFamily="49" charset="0"/>
+                <a:cs typeface="Courier New" panose="02070309020205020404" pitchFamily="49" charset="0"/>
+              </a:rPr>
+              <a:t>slo</a:t>
+            </a:r>
+            <a:endParaRPr lang="en-US" sz="900" dirty="0">
+              <a:latin typeface="Courier New" panose="02070309020205020404" pitchFamily="49" charset="0"/>
+              <a:cs typeface="Courier New" panose="02070309020205020404" pitchFamily="49" charset="0"/>
+            </a:endParaRPr>
+          </a:p>
+        </p:txBody>
+      </p:sp>
+    </p:spTree>
+    <p:extLst>
+      <p:ext uri="{BB962C8B-B14F-4D97-AF65-F5344CB8AC3E}">
+        <p14:creationId xmlns:p14="http://schemas.microsoft.com/office/powerpoint/2010/main" val="3980199250"/>
       </p:ext>
     </p:extLst>
   </p:cSld>

</xml_diff>